<commit_message>
revise architectural design diagram illustrating shared code and separation of application-specific code
</commit_message>
<xml_diff>
--- a/doc/architectural design.pptx
+++ b/doc/architectural design.pptx
@@ -107,6 +107,11 @@
       </a:defRPr>
     </a:lvl9pPr>
   </p:defaultTextStyle>
+  <p:extLst>
+    <p:ext uri="{EFAFB233-063F-42B5-8137-9DF3F51BA10A}">
+      <p15:sldGuideLst xmlns:p15="http://schemas.microsoft.com/office/powerpoint/2012/main"/>
+    </p:ext>
+  </p:extLst>
 </p:presentation>
 </file>
 
@@ -3410,7 +3415,7 @@
         <p:spPr>
           <a:xfrm>
             <a:off x="30048" y="191507"/>
-            <a:ext cx="5756857" cy="6593983"/>
+            <a:ext cx="5756857" cy="6417637"/>
           </a:xfrm>
           <a:prstGeom prst="roundRect">
             <a:avLst/>
@@ -3456,7 +3461,7 @@
         <p:spPr>
           <a:xfrm>
             <a:off x="6191518" y="191507"/>
-            <a:ext cx="5975798" cy="6593983"/>
+            <a:ext cx="5975798" cy="6417637"/>
           </a:xfrm>
           <a:prstGeom prst="roundRect">
             <a:avLst/>
@@ -3501,7 +3506,7 @@
         </p:nvSpPr>
         <p:spPr>
           <a:xfrm>
-            <a:off x="682581" y="421536"/>
+            <a:off x="1136646" y="350713"/>
             <a:ext cx="3451538" cy="523220"/>
           </a:xfrm>
           <a:prstGeom prst="rect">
@@ -3515,6 +3520,7 @@
           </a:bodyPr>
           <a:lstStyle/>
           <a:p>
+            <a:pPr algn="ctr"/>
             <a:r>
               <a:rPr lang="en-US" sz="2800" dirty="0" smtClean="0"/>
               <a:t>Core</a:t>
@@ -3531,7 +3537,7 @@
         </p:nvSpPr>
         <p:spPr>
           <a:xfrm>
-            <a:off x="6811850" y="421536"/>
+            <a:off x="7293736" y="306832"/>
             <a:ext cx="3451538" cy="523220"/>
           </a:xfrm>
           <a:prstGeom prst="rect">
@@ -3545,6 +3551,7 @@
           </a:bodyPr>
           <a:lstStyle/>
           <a:p>
+            <a:pPr algn="ctr"/>
             <a:r>
               <a:rPr lang="en-US" sz="2800" dirty="0" smtClean="0"/>
               <a:t>UI</a:t>
@@ -3561,8 +3568,8 @@
         </p:nvSpPr>
         <p:spPr>
           <a:xfrm>
-            <a:off x="690095" y="883201"/>
-            <a:ext cx="4404574" cy="505239"/>
+            <a:off x="678422" y="872308"/>
+            <a:ext cx="4404574" cy="996017"/>
           </a:xfrm>
           <a:prstGeom prst="rect">
             <a:avLst/>
@@ -3589,8 +3596,26 @@
           <a:lstStyle/>
           <a:p>
             <a:r>
+              <a:rPr lang="en-US" dirty="0" err="1" smtClean="0"/>
+              <a:t>InputFile</a:t>
+            </a:r>
+            <a:r>
               <a:rPr lang="en-US" dirty="0" smtClean="0"/>
-              <a:t>Input File: shared reading/writing code</a:t>
+              <a:t>: shared </a:t>
+            </a:r>
+            <a:r>
+              <a:rPr lang="en-US" dirty="0" smtClean="0"/>
+              <a:t>file reading/writing code</a:t>
+            </a:r>
+          </a:p>
+          <a:p>
+            <a:r>
+              <a:rPr lang="en-US" dirty="0"/>
+              <a:t>	</a:t>
+            </a:r>
+            <a:r>
+              <a:rPr lang="en-US" dirty="0" smtClean="0"/>
+              <a:t>useful to both models</a:t>
             </a:r>
             <a:endParaRPr lang="en-US" dirty="0"/>
           </a:p>
@@ -3598,14 +3623,14 @@
       </p:sp>
       <p:sp>
         <p:nvSpPr>
-          <p:cNvPr id="9" name="Rectangle 8"/>
+          <p:cNvPr id="10" name="Rectangle 9"/>
           <p:cNvSpPr/>
           <p:nvPr/>
         </p:nvSpPr>
         <p:spPr>
           <a:xfrm>
-            <a:off x="682581" y="1481070"/>
-            <a:ext cx="4404574" cy="505239"/>
+            <a:off x="6817218" y="872308"/>
+            <a:ext cx="4404574" cy="996017"/>
           </a:xfrm>
           <a:prstGeom prst="rect">
             <a:avLst/>
@@ -3631,49 +3656,6 @@
           <a:bodyPr rtlCol="0" anchor="ctr"/>
           <a:lstStyle/>
           <a:p>
-            <a:r>
-              <a:rPr lang="en-US" dirty="0" smtClean="0"/>
-              <a:t>Coordinates: shared structure for X,Y values</a:t>
-            </a:r>
-            <a:endParaRPr lang="en-US" dirty="0"/>
-          </a:p>
-        </p:txBody>
-      </p:sp>
-      <p:sp>
-        <p:nvSpPr>
-          <p:cNvPr id="10" name="Rectangle 9"/>
-          <p:cNvSpPr/>
-          <p:nvPr/>
-        </p:nvSpPr>
-        <p:spPr>
-          <a:xfrm>
-            <a:off x="6817218" y="872308"/>
-            <a:ext cx="4404574" cy="761829"/>
-          </a:xfrm>
-          <a:prstGeom prst="rect">
-            <a:avLst/>
-          </a:prstGeom>
-        </p:spPr>
-        <p:style>
-          <a:lnRef idx="2">
-            <a:schemeClr val="accent1">
-              <a:shade val="50000"/>
-            </a:schemeClr>
-          </a:lnRef>
-          <a:fillRef idx="1">
-            <a:schemeClr val="accent1"/>
-          </a:fillRef>
-          <a:effectRef idx="0">
-            <a:schemeClr val="accent1"/>
-          </a:effectRef>
-          <a:fontRef idx="minor">
-            <a:schemeClr val="lt1"/>
-          </a:fontRef>
-        </p:style>
-        <p:txBody>
-          <a:bodyPr rtlCol="0" anchor="ctr"/>
-          <a:lstStyle/>
-          <a:p>
             <a:pPr indent="-457200"/>
             <a:r>
               <a:rPr lang="en-US" dirty="0" err="1" smtClean="0"/>
@@ -3681,7 +3663,11 @@
             </a:r>
             <a:r>
               <a:rPr lang="en-US" dirty="0" smtClean="0"/>
-              <a:t>: shared main form with menus, 	toolbars, panels, scripting, plugins</a:t>
+              <a:t>: shared main form with menus, 	toolbars, panels, scripting, </a:t>
+            </a:r>
+            <a:r>
+              <a:rPr lang="en-US" dirty="0" smtClean="0"/>
+              <a:t>plugins 	useful to both models</a:t>
             </a:r>
             <a:endParaRPr lang="en-US" dirty="0"/>
           </a:p>
@@ -3696,7 +3682,7 @@
         <p:spPr>
           <a:xfrm>
             <a:off x="420439" y="2326339"/>
-            <a:ext cx="2369710" cy="4196785"/>
+            <a:ext cx="2369710" cy="3866117"/>
           </a:xfrm>
           <a:prstGeom prst="roundRect">
             <a:avLst/>
@@ -3725,8 +3711,9 @@
           <a:bodyPr rtlCol="0" anchor="ctr"/>
           <a:lstStyle/>
           <a:p>
-            <a:r>
-              <a:rPr lang="en-US" sz="2400" smtClean="0">
+            <a:pPr algn="ctr"/>
+            <a:r>
+              <a:rPr lang="en-US" sz="2400" dirty="0" smtClean="0">
                 <a:solidFill>
                   <a:schemeClr val="tx1"/>
                 </a:solidFill>
@@ -3735,63 +3722,63 @@
             </a:r>
           </a:p>
           <a:p>
-            <a:endParaRPr lang="en-US" sz="2400" smtClean="0">
+            <a:endParaRPr lang="en-US" sz="2400" dirty="0" smtClean="0">
               <a:solidFill>
                 <a:schemeClr val="tx1"/>
               </a:solidFill>
             </a:endParaRPr>
           </a:p>
           <a:p>
-            <a:endParaRPr lang="en-US" sz="2400" smtClean="0">
+            <a:endParaRPr lang="en-US" sz="2400" dirty="0" smtClean="0">
               <a:solidFill>
                 <a:schemeClr val="tx1"/>
               </a:solidFill>
             </a:endParaRPr>
           </a:p>
           <a:p>
-            <a:endParaRPr lang="en-US" sz="2400" smtClean="0">
+            <a:endParaRPr lang="en-US" sz="2400" dirty="0" smtClean="0">
               <a:solidFill>
                 <a:schemeClr val="tx1"/>
               </a:solidFill>
             </a:endParaRPr>
           </a:p>
           <a:p>
-            <a:endParaRPr lang="en-US" sz="2400" smtClean="0">
+            <a:endParaRPr lang="en-US" sz="2400" dirty="0" smtClean="0">
               <a:solidFill>
                 <a:schemeClr val="tx1"/>
               </a:solidFill>
             </a:endParaRPr>
           </a:p>
           <a:p>
-            <a:endParaRPr lang="en-US" sz="2400" smtClean="0">
+            <a:endParaRPr lang="en-US" sz="2400" dirty="0" smtClean="0">
               <a:solidFill>
                 <a:schemeClr val="tx1"/>
               </a:solidFill>
             </a:endParaRPr>
           </a:p>
           <a:p>
-            <a:endParaRPr lang="en-US" sz="2400" smtClean="0">
+            <a:endParaRPr lang="en-US" sz="2400" dirty="0" smtClean="0">
               <a:solidFill>
                 <a:schemeClr val="tx1"/>
               </a:solidFill>
             </a:endParaRPr>
           </a:p>
           <a:p>
-            <a:endParaRPr lang="en-US" sz="2400" smtClean="0">
+            <a:endParaRPr lang="en-US" sz="2400" dirty="0" smtClean="0">
               <a:solidFill>
                 <a:schemeClr val="tx1"/>
               </a:solidFill>
             </a:endParaRPr>
           </a:p>
           <a:p>
-            <a:endParaRPr lang="en-US" sz="2400" smtClean="0">
+            <a:endParaRPr lang="en-US" sz="2400" dirty="0" smtClean="0">
               <a:solidFill>
                 <a:schemeClr val="tx1"/>
               </a:solidFill>
             </a:endParaRPr>
           </a:p>
           <a:p>
-            <a:endParaRPr lang="en-US" sz="2400" smtClean="0">
+            <a:endParaRPr lang="en-US" sz="2400" dirty="0" smtClean="0">
               <a:solidFill>
                 <a:schemeClr val="tx1"/>
               </a:solidFill>
@@ -3814,8 +3801,8 @@
         </p:nvSpPr>
         <p:spPr>
           <a:xfrm>
-            <a:off x="2994611" y="2319924"/>
-            <a:ext cx="2395469" cy="4196785"/>
+            <a:off x="2994611" y="2319925"/>
+            <a:ext cx="2395469" cy="3872532"/>
           </a:xfrm>
           <a:prstGeom prst="roundRect">
             <a:avLst/>
@@ -3844,6 +3831,7 @@
           <a:bodyPr rtlCol="0" anchor="ctr"/>
           <a:lstStyle/>
           <a:p>
+            <a:pPr algn="ctr"/>
             <a:r>
               <a:rPr lang="en-US" sz="2400" dirty="0" smtClean="0">
                 <a:solidFill>
@@ -3934,7 +3922,7 @@
         <p:spPr>
           <a:xfrm>
             <a:off x="6572519" y="2308882"/>
-            <a:ext cx="2446986" cy="4231698"/>
+            <a:ext cx="2446986" cy="3883574"/>
           </a:xfrm>
           <a:prstGeom prst="roundRect">
             <a:avLst/>
@@ -3963,6 +3951,7 @@
           <a:bodyPr rtlCol="0" anchor="ctr"/>
           <a:lstStyle/>
           <a:p>
+            <a:pPr algn="ctr"/>
             <a:r>
               <a:rPr lang="en-US" sz="2400" dirty="0" smtClean="0">
                 <a:solidFill>
@@ -4052,8 +4041,8 @@
         </p:nvSpPr>
         <p:spPr>
           <a:xfrm>
-            <a:off x="9376090" y="2285012"/>
-            <a:ext cx="2395470" cy="4231697"/>
+            <a:off x="9376090" y="2285013"/>
+            <a:ext cx="2395470" cy="3907444"/>
           </a:xfrm>
           <a:prstGeom prst="roundRect">
             <a:avLst/>
@@ -4082,6 +4071,7 @@
           <a:bodyPr rtlCol="0" anchor="ctr"/>
           <a:lstStyle/>
           <a:p>
+            <a:pPr algn="ctr"/>
             <a:r>
               <a:rPr lang="en-US" sz="2400" dirty="0" smtClean="0">
                 <a:solidFill>
@@ -4213,7 +4203,11 @@
             </a:r>
             <a:r>
               <a:rPr lang="en-US" sz="1600" dirty="0" smtClean="0"/>
-              <a:t>, adds SWMM features (project sections  in tree control, icon, title, etc.</a:t>
+              <a:t>, adds SWMM features (project sections  in tree control, icon, title, etc</a:t>
+            </a:r>
+            <a:r>
+              <a:rPr lang="en-US" sz="1600" dirty="0" smtClean="0"/>
+              <a:t>.)</a:t>
             </a:r>
             <a:endParaRPr lang="en-US" sz="1600" dirty="0"/>
           </a:p>
@@ -4256,8 +4250,20 @@
           <a:p>
             <a:pPr indent="-457200"/>
             <a:r>
+              <a:rPr lang="en-US" sz="1600" dirty="0"/>
+              <a:t>F</a:t>
+            </a:r>
+            <a:r>
               <a:rPr lang="en-US" sz="1600" dirty="0" smtClean="0"/>
-              <a:t>Custom forms for SWMM-only properties</a:t>
+              <a:t>orms </a:t>
+            </a:r>
+            <a:r>
+              <a:rPr lang="en-US" sz="1600" dirty="0" smtClean="0"/>
+              <a:t>for </a:t>
+            </a:r>
+            <a:r>
+              <a:rPr lang="en-US" sz="1600" dirty="0" smtClean="0"/>
+              <a:t>editing SWMM-specific properties…</a:t>
             </a:r>
             <a:endParaRPr lang="en-US" sz="1600" dirty="0"/>
           </a:p>
@@ -4313,7 +4319,11 @@
             </a:r>
             <a:r>
               <a:rPr lang="en-US" sz="1600" dirty="0" smtClean="0"/>
-              <a:t>, adds EPANET features (project sections  in tree control, icon, title, etc.</a:t>
+              <a:t>, adds EPANET features (project sections  in tree control, icon, title, etc</a:t>
+            </a:r>
+            <a:r>
+              <a:rPr lang="en-US" sz="1600" dirty="0" smtClean="0"/>
+              <a:t>.)</a:t>
             </a:r>
             <a:endParaRPr lang="en-US" sz="1600" dirty="0"/>
           </a:p>
@@ -4357,7 +4367,15 @@
             <a:pPr indent="-457200"/>
             <a:r>
               <a:rPr lang="en-US" sz="1600" dirty="0" smtClean="0"/>
-              <a:t>Custom forms for EPANET-only properties</a:t>
+              <a:t>Forms </a:t>
+            </a:r>
+            <a:r>
+              <a:rPr lang="en-US" sz="1600" dirty="0" smtClean="0"/>
+              <a:t>for </a:t>
+            </a:r>
+            <a:r>
+              <a:rPr lang="en-US" sz="1600" dirty="0" smtClean="0"/>
+              <a:t>editing EPANET-specific properties…</a:t>
             </a:r>
             <a:endParaRPr lang="en-US" sz="1600" dirty="0"/>
           </a:p>
@@ -4400,8 +4418,24 @@
           <a:p>
             <a:pPr indent="-457200"/>
             <a:r>
+              <a:rPr lang="en-US" sz="1600" dirty="0" err="1" smtClean="0"/>
+              <a:t>SWMM.Project</a:t>
+            </a:r>
+            <a:r>
               <a:rPr lang="en-US" sz="1600" dirty="0" smtClean="0"/>
-              <a:t>Project: inherits from Input File and implements for SWMM sections</a:t>
+              <a:t>: inherits from </a:t>
+            </a:r>
+            <a:r>
+              <a:rPr lang="en-US" sz="1600" dirty="0" err="1" smtClean="0"/>
+              <a:t>InputFile</a:t>
+            </a:r>
+            <a:r>
+              <a:rPr lang="en-US" sz="1600" dirty="0" smtClean="0"/>
+              <a:t> </a:t>
+            </a:r>
+            <a:r>
+              <a:rPr lang="en-US" sz="1600" dirty="0" smtClean="0"/>
+              <a:t>and implements for SWMM sections</a:t>
             </a:r>
             <a:endParaRPr lang="en-US" sz="1600" dirty="0"/>
           </a:p>
@@ -4444,8 +4478,24 @@
           <a:p>
             <a:pPr indent="-457200"/>
             <a:r>
+              <a:rPr lang="en-US" sz="1600" dirty="0" err="1" smtClean="0"/>
+              <a:t>EPANET.Project</a:t>
+            </a:r>
+            <a:r>
               <a:rPr lang="en-US" sz="1600" dirty="0" smtClean="0"/>
-              <a:t>Project: inherits from Input File and implements for EPANET sections</a:t>
+              <a:t>: inherits from </a:t>
+            </a:r>
+            <a:r>
+              <a:rPr lang="en-US" sz="1600" dirty="0" err="1" smtClean="0"/>
+              <a:t>InputFile</a:t>
+            </a:r>
+            <a:r>
+              <a:rPr lang="en-US" sz="1600" dirty="0" smtClean="0"/>
+              <a:t> </a:t>
+            </a:r>
+            <a:r>
+              <a:rPr lang="en-US" sz="1600" dirty="0" smtClean="0"/>
+              <a:t>and implements for EPANET sections</a:t>
             </a:r>
             <a:endParaRPr lang="en-US" sz="1600" dirty="0"/>
           </a:p>
@@ -4460,7 +4510,7 @@
         <p:spPr>
           <a:xfrm>
             <a:off x="763208" y="4268788"/>
-            <a:ext cx="1774596" cy="292656"/>
+            <a:ext cx="1774596" cy="627230"/>
           </a:xfrm>
           <a:prstGeom prst="rect">
             <a:avLst/>
@@ -4489,7 +4539,7 @@
             <a:pPr indent="-457200"/>
             <a:r>
               <a:rPr lang="en-US" sz="1600" dirty="0" smtClean="0"/>
-              <a:t>…</a:t>
+              <a:t>SWMM-specific project sections…</a:t>
             </a:r>
             <a:endParaRPr lang="en-US" sz="1600" dirty="0"/>
           </a:p>
@@ -4504,7 +4554,7 @@
         <p:spPr>
           <a:xfrm>
             <a:off x="3290825" y="4268788"/>
-            <a:ext cx="1774596" cy="292656"/>
+            <a:ext cx="1774596" cy="627230"/>
           </a:xfrm>
           <a:prstGeom prst="rect">
             <a:avLst/>
@@ -4533,170 +4583,12 @@
             <a:pPr indent="-457200"/>
             <a:r>
               <a:rPr lang="en-US" sz="1600" dirty="0" smtClean="0"/>
-              <a:t>…</a:t>
+              <a:t>EPANET-specific project sections…</a:t>
             </a:r>
             <a:endParaRPr lang="en-US" sz="1600" dirty="0"/>
           </a:p>
         </p:txBody>
       </p:sp>
-      <p:sp>
-        <p:nvSpPr>
-          <p:cNvPr id="25" name="Rectangle 24"/>
-          <p:cNvSpPr/>
-          <p:nvPr/>
-        </p:nvSpPr>
-        <p:spPr>
-          <a:xfrm>
-            <a:off x="6890870" y="5992623"/>
-            <a:ext cx="1774596" cy="292656"/>
-          </a:xfrm>
-          <a:prstGeom prst="rect">
-            <a:avLst/>
-          </a:prstGeom>
-        </p:spPr>
-        <p:style>
-          <a:lnRef idx="2">
-            <a:schemeClr val="accent1">
-              <a:shade val="50000"/>
-            </a:schemeClr>
-          </a:lnRef>
-          <a:fillRef idx="1">
-            <a:schemeClr val="accent1"/>
-          </a:fillRef>
-          <a:effectRef idx="0">
-            <a:schemeClr val="accent1"/>
-          </a:effectRef>
-          <a:fontRef idx="minor">
-            <a:schemeClr val="lt1"/>
-          </a:fontRef>
-        </p:style>
-        <p:txBody>
-          <a:bodyPr rtlCol="0" anchor="ctr"/>
-          <a:lstStyle/>
-          <a:p>
-            <a:pPr indent="-457200"/>
-            <a:r>
-              <a:rPr lang="en-US" sz="1600" dirty="0" smtClean="0"/>
-              <a:t>…</a:t>
-            </a:r>
-            <a:endParaRPr lang="en-US" sz="1600" dirty="0"/>
-          </a:p>
-        </p:txBody>
-      </p:sp>
-      <p:sp>
-        <p:nvSpPr>
-          <p:cNvPr id="26" name="Rectangle 25"/>
-          <p:cNvSpPr/>
-          <p:nvPr/>
-        </p:nvSpPr>
-        <p:spPr>
-          <a:xfrm>
-            <a:off x="9621725" y="5999629"/>
-            <a:ext cx="1774596" cy="292656"/>
-          </a:xfrm>
-          <a:prstGeom prst="rect">
-            <a:avLst/>
-          </a:prstGeom>
-        </p:spPr>
-        <p:style>
-          <a:lnRef idx="2">
-            <a:schemeClr val="accent1">
-              <a:shade val="50000"/>
-            </a:schemeClr>
-          </a:lnRef>
-          <a:fillRef idx="1">
-            <a:schemeClr val="accent1"/>
-          </a:fillRef>
-          <a:effectRef idx="0">
-            <a:schemeClr val="accent1"/>
-          </a:effectRef>
-          <a:fontRef idx="minor">
-            <a:schemeClr val="lt1"/>
-          </a:fontRef>
-        </p:style>
-        <p:txBody>
-          <a:bodyPr rtlCol="0" anchor="ctr"/>
-          <a:lstStyle/>
-          <a:p>
-            <a:pPr indent="-457200"/>
-            <a:r>
-              <a:rPr lang="en-US" sz="1600" dirty="0" smtClean="0"/>
-              <a:t>…</a:t>
-            </a:r>
-            <a:endParaRPr lang="en-US" sz="1600" dirty="0"/>
-          </a:p>
-        </p:txBody>
-      </p:sp>
-      <p:cxnSp>
-        <p:nvCxnSpPr>
-          <p:cNvPr id="37" name="Elbow Connector 36"/>
-          <p:cNvCxnSpPr>
-            <a:stCxn id="8" idx="1"/>
-          </p:cNvCxnSpPr>
-          <p:nvPr/>
-        </p:nvCxnSpPr>
-        <p:spPr>
-          <a:xfrm rot="10800000" flipH="1" flipV="1">
-            <a:off x="690094" y="1135821"/>
-            <a:ext cx="146229" cy="2381036"/>
-          </a:xfrm>
-          <a:prstGeom prst="bentConnector4">
-            <a:avLst>
-              <a:gd name="adj1" fmla="val -297247"/>
-              <a:gd name="adj2" fmla="val 100199"/>
-            </a:avLst>
-          </a:prstGeom>
-        </p:spPr>
-        <p:style>
-          <a:lnRef idx="1">
-            <a:schemeClr val="accent1"/>
-          </a:lnRef>
-          <a:fillRef idx="0">
-            <a:schemeClr val="accent1"/>
-          </a:fillRef>
-          <a:effectRef idx="0">
-            <a:schemeClr val="accent1"/>
-          </a:effectRef>
-          <a:fontRef idx="minor">
-            <a:schemeClr val="tx1"/>
-          </a:fontRef>
-        </p:style>
-      </p:cxnSp>
-      <p:cxnSp>
-        <p:nvCxnSpPr>
-          <p:cNvPr id="46" name="Elbow Connector 45"/>
-          <p:cNvCxnSpPr>
-            <a:endCxn id="21" idx="3"/>
-          </p:cNvCxnSpPr>
-          <p:nvPr/>
-        </p:nvCxnSpPr>
-        <p:spPr>
-          <a:xfrm rot="16200000" flipH="1">
-            <a:off x="3849840" y="2263125"/>
-            <a:ext cx="2352680" cy="98071"/>
-          </a:xfrm>
-          <a:prstGeom prst="bentConnector4">
-            <a:avLst>
-              <a:gd name="adj1" fmla="val 601"/>
-              <a:gd name="adj2" fmla="val 608871"/>
-            </a:avLst>
-          </a:prstGeom>
-        </p:spPr>
-        <p:style>
-          <a:lnRef idx="1">
-            <a:schemeClr val="accent1"/>
-          </a:lnRef>
-          <a:fillRef idx="0">
-            <a:schemeClr val="accent1"/>
-          </a:fillRef>
-          <a:effectRef idx="0">
-            <a:schemeClr val="accent1"/>
-          </a:effectRef>
-          <a:fontRef idx="minor">
-            <a:schemeClr val="tx1"/>
-          </a:fontRef>
-        </p:style>
-      </p:cxnSp>
       <p:cxnSp>
         <p:nvCxnSpPr>
           <p:cNvPr id="53" name="Elbow Connector 52"/>
@@ -4704,16 +4596,17 @@
           <p:nvPr/>
         </p:nvCxnSpPr>
         <p:spPr>
-          <a:xfrm rot="10800000" flipH="1" flipV="1">
-            <a:off x="6817756" y="1253222"/>
-            <a:ext cx="146229" cy="2381036"/>
+          <a:xfrm flipH="1">
+            <a:off x="8683311" y="1892194"/>
+            <a:ext cx="449114" cy="911565"/>
           </a:xfrm>
-          <a:prstGeom prst="bentConnector4">
-            <a:avLst>
-              <a:gd name="adj1" fmla="val -297247"/>
-              <a:gd name="adj2" fmla="val 105067"/>
-            </a:avLst>
+          <a:prstGeom prst="straightConnector1">
+            <a:avLst/>
           </a:prstGeom>
+          <a:ln>
+            <a:headEnd type="none"/>
+            <a:tailEnd type="triangle"/>
+          </a:ln>
         </p:spPr>
         <p:style>
           <a:lnRef idx="1">
@@ -4733,22 +4626,86 @@
       <p:cxnSp>
         <p:nvCxnSpPr>
           <p:cNvPr id="72" name="Elbow Connector 71"/>
-          <p:cNvCxnSpPr>
-            <a:stCxn id="10" idx="3"/>
-            <a:endCxn id="17" idx="3"/>
-          </p:cNvCxnSpPr>
+          <p:cNvCxnSpPr/>
           <p:nvPr/>
         </p:nvCxnSpPr>
         <p:spPr>
           <a:xfrm>
-            <a:off x="11221792" y="1253223"/>
-            <a:ext cx="198547" cy="2529176"/>
+            <a:off x="9225023" y="1892194"/>
+            <a:ext cx="420720" cy="920381"/>
           </a:xfrm>
-          <a:prstGeom prst="bentConnector3">
-            <a:avLst>
-              <a:gd name="adj1" fmla="val 383786"/>
-            </a:avLst>
+          <a:prstGeom prst="straightConnector1">
+            <a:avLst/>
           </a:prstGeom>
+          <a:ln w="12700">
+            <a:tailEnd type="triangle"/>
+          </a:ln>
+        </p:spPr>
+        <p:style>
+          <a:lnRef idx="1">
+            <a:schemeClr val="accent1"/>
+          </a:lnRef>
+          <a:fillRef idx="0">
+            <a:schemeClr val="accent1"/>
+          </a:fillRef>
+          <a:effectRef idx="0">
+            <a:schemeClr val="accent1"/>
+          </a:effectRef>
+          <a:fontRef idx="minor">
+            <a:schemeClr val="tx1"/>
+          </a:fontRef>
+        </p:style>
+      </p:cxnSp>
+      <p:cxnSp>
+        <p:nvCxnSpPr>
+          <p:cNvPr id="31" name="Straight Arrow Connector 30"/>
+          <p:cNvCxnSpPr/>
+          <p:nvPr/>
+        </p:nvCxnSpPr>
+        <p:spPr>
+          <a:xfrm>
+            <a:off x="2994611" y="1903238"/>
+            <a:ext cx="306009" cy="935132"/>
+          </a:xfrm>
+          <a:prstGeom prst="straightConnector1">
+            <a:avLst/>
+          </a:prstGeom>
+          <a:ln>
+            <a:tailEnd type="triangle"/>
+          </a:ln>
+        </p:spPr>
+        <p:style>
+          <a:lnRef idx="1">
+            <a:schemeClr val="accent1"/>
+          </a:lnRef>
+          <a:fillRef idx="0">
+            <a:schemeClr val="accent1"/>
+          </a:fillRef>
+          <a:effectRef idx="0">
+            <a:schemeClr val="accent1"/>
+          </a:effectRef>
+          <a:fontRef idx="minor">
+            <a:schemeClr val="tx1"/>
+          </a:fontRef>
+        </p:style>
+      </p:cxnSp>
+      <p:cxnSp>
+        <p:nvCxnSpPr>
+          <p:cNvPr id="33" name="Straight Arrow Connector 32"/>
+          <p:cNvCxnSpPr/>
+          <p:nvPr/>
+        </p:nvCxnSpPr>
+        <p:spPr>
+          <a:xfrm flipH="1">
+            <a:off x="2551256" y="1909651"/>
+            <a:ext cx="342415" cy="902924"/>
+          </a:xfrm>
+          <a:prstGeom prst="straightConnector1">
+            <a:avLst/>
+          </a:prstGeom>
+          <a:ln>
+            <a:tailEnd type="triangle"/>
+          </a:ln>
         </p:spPr>
         <p:style>
           <a:lnRef idx="1">

</xml_diff>

<commit_message>
slightly refined architectural design.pptx, incorporated refined graphic into design document
</commit_message>
<xml_diff>
--- a/doc/architectural design.pptx
+++ b/doc/architectural design.pptx
@@ -3601,11 +3601,7 @@
             </a:r>
             <a:r>
               <a:rPr lang="en-US" dirty="0" smtClean="0"/>
-              <a:t>: shared </a:t>
-            </a:r>
-            <a:r>
-              <a:rPr lang="en-US" dirty="0" smtClean="0"/>
-              <a:t>file reading/writing code</a:t>
+              <a:t>: shared file reading/writing code</a:t>
             </a:r>
           </a:p>
           <a:p>
@@ -3663,11 +3659,7 @@
             </a:r>
             <a:r>
               <a:rPr lang="en-US" dirty="0" smtClean="0"/>
-              <a:t>: shared main form with menus, 	toolbars, panels, scripting, </a:t>
-            </a:r>
-            <a:r>
-              <a:rPr lang="en-US" dirty="0" smtClean="0"/>
-              <a:t>plugins 	useful to both models</a:t>
+              <a:t>: shared main form with menus, 	toolbars, panels, scripting, plugins 	useful to both models</a:t>
             </a:r>
             <a:endParaRPr lang="en-US" dirty="0"/>
           </a:p>
@@ -3711,17 +3703,6 @@
           <a:bodyPr rtlCol="0" anchor="ctr"/>
           <a:lstStyle/>
           <a:p>
-            <a:pPr algn="ctr"/>
-            <a:r>
-              <a:rPr lang="en-US" sz="2400" dirty="0" smtClean="0">
-                <a:solidFill>
-                  <a:schemeClr val="tx1"/>
-                </a:solidFill>
-              </a:rPr>
-              <a:t>SWMM</a:t>
-            </a:r>
-          </a:p>
-          <a:p>
             <a:endParaRPr lang="en-US" sz="2400" dirty="0" smtClean="0">
               <a:solidFill>
                 <a:schemeClr val="tx1"/>
@@ -3831,80 +3812,6 @@
           <a:bodyPr rtlCol="0" anchor="ctr"/>
           <a:lstStyle/>
           <a:p>
-            <a:pPr algn="ctr"/>
-            <a:r>
-              <a:rPr lang="en-US" sz="2400" dirty="0" smtClean="0">
-                <a:solidFill>
-                  <a:schemeClr val="tx1"/>
-                </a:solidFill>
-              </a:rPr>
-              <a:t>EPANET</a:t>
-            </a:r>
-          </a:p>
-          <a:p>
-            <a:endParaRPr lang="en-US" sz="2400" dirty="0">
-              <a:solidFill>
-                <a:schemeClr val="tx1"/>
-              </a:solidFill>
-            </a:endParaRPr>
-          </a:p>
-          <a:p>
-            <a:endParaRPr lang="en-US" sz="2400" dirty="0" smtClean="0">
-              <a:solidFill>
-                <a:schemeClr val="tx1"/>
-              </a:solidFill>
-            </a:endParaRPr>
-          </a:p>
-          <a:p>
-            <a:endParaRPr lang="en-US" sz="2400" dirty="0" smtClean="0">
-              <a:solidFill>
-                <a:schemeClr val="tx1"/>
-              </a:solidFill>
-            </a:endParaRPr>
-          </a:p>
-          <a:p>
-            <a:endParaRPr lang="en-US" sz="2400" dirty="0">
-              <a:solidFill>
-                <a:schemeClr val="tx1"/>
-              </a:solidFill>
-            </a:endParaRPr>
-          </a:p>
-          <a:p>
-            <a:endParaRPr lang="en-US" sz="2400" dirty="0" smtClean="0">
-              <a:solidFill>
-                <a:schemeClr val="tx1"/>
-              </a:solidFill>
-            </a:endParaRPr>
-          </a:p>
-          <a:p>
-            <a:endParaRPr lang="en-US" sz="2400" dirty="0">
-              <a:solidFill>
-                <a:schemeClr val="tx1"/>
-              </a:solidFill>
-            </a:endParaRPr>
-          </a:p>
-          <a:p>
-            <a:endParaRPr lang="en-US" sz="2400" dirty="0" smtClean="0">
-              <a:solidFill>
-                <a:schemeClr val="tx1"/>
-              </a:solidFill>
-            </a:endParaRPr>
-          </a:p>
-          <a:p>
-            <a:endParaRPr lang="en-US" sz="2400" dirty="0">
-              <a:solidFill>
-                <a:schemeClr val="tx1"/>
-              </a:solidFill>
-            </a:endParaRPr>
-          </a:p>
-          <a:p>
-            <a:endParaRPr lang="en-US" sz="2400" dirty="0" smtClean="0">
-              <a:solidFill>
-                <a:schemeClr val="tx1"/>
-              </a:solidFill>
-            </a:endParaRPr>
-          </a:p>
-          <a:p>
             <a:endParaRPr lang="en-US" sz="2400" dirty="0">
               <a:solidFill>
                 <a:schemeClr val="tx1"/>
@@ -3951,17 +3858,6 @@
           <a:bodyPr rtlCol="0" anchor="ctr"/>
           <a:lstStyle/>
           <a:p>
-            <a:pPr algn="ctr"/>
-            <a:r>
-              <a:rPr lang="en-US" sz="2400" dirty="0" smtClean="0">
-                <a:solidFill>
-                  <a:schemeClr val="tx1"/>
-                </a:solidFill>
-              </a:rPr>
-              <a:t>SWMM</a:t>
-            </a:r>
-          </a:p>
-          <a:p>
             <a:endParaRPr lang="en-US" sz="2400" dirty="0">
               <a:solidFill>
                 <a:schemeClr val="tx1"/>
@@ -4071,17 +3967,6 @@
           <a:bodyPr rtlCol="0" anchor="ctr"/>
           <a:lstStyle/>
           <a:p>
-            <a:pPr algn="ctr"/>
-            <a:r>
-              <a:rPr lang="en-US" sz="2400" dirty="0" smtClean="0">
-                <a:solidFill>
-                  <a:schemeClr val="tx1"/>
-                </a:solidFill>
-              </a:rPr>
-              <a:t>EPANET</a:t>
-            </a:r>
-          </a:p>
-          <a:p>
             <a:endParaRPr lang="en-US" sz="2400" dirty="0">
               <a:solidFill>
                 <a:schemeClr val="tx1"/>
@@ -4203,11 +4088,7 @@
             </a:r>
             <a:r>
               <a:rPr lang="en-US" sz="1600" dirty="0" smtClean="0"/>
-              <a:t>, adds SWMM features (project sections  in tree control, icon, title, etc</a:t>
-            </a:r>
-            <a:r>
-              <a:rPr lang="en-US" sz="1600" dirty="0" smtClean="0"/>
-              <a:t>.)</a:t>
+              <a:t>, adds SWMM features (project sections  in tree control, icon, title, etc.)</a:t>
             </a:r>
             <a:endParaRPr lang="en-US" sz="1600" dirty="0"/>
           </a:p>
@@ -4255,15 +4136,7 @@
             </a:r>
             <a:r>
               <a:rPr lang="en-US" sz="1600" dirty="0" smtClean="0"/>
-              <a:t>orms </a:t>
-            </a:r>
-            <a:r>
-              <a:rPr lang="en-US" sz="1600" dirty="0" smtClean="0"/>
-              <a:t>for </a:t>
-            </a:r>
-            <a:r>
-              <a:rPr lang="en-US" sz="1600" dirty="0" smtClean="0"/>
-              <a:t>editing SWMM-specific properties…</a:t>
+              <a:t>orms for editing SWMM-specific properties…</a:t>
             </a:r>
             <a:endParaRPr lang="en-US" sz="1600" dirty="0"/>
           </a:p>
@@ -4319,11 +4192,7 @@
             </a:r>
             <a:r>
               <a:rPr lang="en-US" sz="1600" dirty="0" smtClean="0"/>
-              <a:t>, adds EPANET features (project sections  in tree control, icon, title, etc</a:t>
-            </a:r>
-            <a:r>
-              <a:rPr lang="en-US" sz="1600" dirty="0" smtClean="0"/>
-              <a:t>.)</a:t>
+              <a:t>, adds EPANET features (project sections  in tree control, icon, title, etc.)</a:t>
             </a:r>
             <a:endParaRPr lang="en-US" sz="1600" dirty="0"/>
           </a:p>
@@ -4367,15 +4236,7 @@
             <a:pPr indent="-457200"/>
             <a:r>
               <a:rPr lang="en-US" sz="1600" dirty="0" smtClean="0"/>
-              <a:t>Forms </a:t>
-            </a:r>
-            <a:r>
-              <a:rPr lang="en-US" sz="1600" dirty="0" smtClean="0"/>
-              <a:t>for </a:t>
-            </a:r>
-            <a:r>
-              <a:rPr lang="en-US" sz="1600" dirty="0" smtClean="0"/>
-              <a:t>editing EPANET-specific properties…</a:t>
+              <a:t>Forms for editing EPANET-specific properties…</a:t>
             </a:r>
             <a:endParaRPr lang="en-US" sz="1600" dirty="0"/>
           </a:p>
@@ -4431,11 +4292,7 @@
             </a:r>
             <a:r>
               <a:rPr lang="en-US" sz="1600" dirty="0" smtClean="0"/>
-              <a:t> </a:t>
-            </a:r>
-            <a:r>
-              <a:rPr lang="en-US" sz="1600" dirty="0" smtClean="0"/>
-              <a:t>and implements for SWMM sections</a:t>
+              <a:t> and implements for SWMM sections</a:t>
             </a:r>
             <a:endParaRPr lang="en-US" sz="1600" dirty="0"/>
           </a:p>
@@ -4491,11 +4348,7 @@
             </a:r>
             <a:r>
               <a:rPr lang="en-US" sz="1600" dirty="0" smtClean="0"/>
-              <a:t> </a:t>
-            </a:r>
-            <a:r>
-              <a:rPr lang="en-US" sz="1600" dirty="0" smtClean="0"/>
-              <a:t>and implements for EPANET sections</a:t>
+              <a:t> and implements for EPANET sections</a:t>
             </a:r>
             <a:endParaRPr lang="en-US" sz="1600" dirty="0"/>
           </a:p>
@@ -4603,7 +4456,7 @@
           <a:prstGeom prst="straightConnector1">
             <a:avLst/>
           </a:prstGeom>
-          <a:ln>
+          <a:ln w="28575">
             <a:headEnd type="none"/>
             <a:tailEnd type="triangle"/>
           </a:ln>
@@ -4637,7 +4490,7 @@
           <a:prstGeom prst="straightConnector1">
             <a:avLst/>
           </a:prstGeom>
-          <a:ln w="12700">
+          <a:ln w="28575">
             <a:tailEnd type="triangle"/>
           </a:ln>
         </p:spPr>
@@ -4670,7 +4523,7 @@
           <a:prstGeom prst="straightConnector1">
             <a:avLst/>
           </a:prstGeom>
-          <a:ln>
+          <a:ln w="28575">
             <a:tailEnd type="triangle"/>
           </a:ln>
         </p:spPr>
@@ -4703,7 +4556,7 @@
           <a:prstGeom prst="straightConnector1">
             <a:avLst/>
           </a:prstGeom>
-          <a:ln>
+          <a:ln w="28575">
             <a:tailEnd type="triangle"/>
           </a:ln>
         </p:spPr>
@@ -4722,6 +4575,126 @@
           </a:fontRef>
         </p:style>
       </p:cxnSp>
+      <p:sp>
+        <p:nvSpPr>
+          <p:cNvPr id="2" name="TextBox 1"/>
+          <p:cNvSpPr txBox="1"/>
+          <p:nvPr/>
+        </p:nvSpPr>
+        <p:spPr>
+          <a:xfrm>
+            <a:off x="3681621" y="2338881"/>
+            <a:ext cx="988091" cy="400110"/>
+          </a:xfrm>
+          <a:prstGeom prst="rect">
+            <a:avLst/>
+          </a:prstGeom>
+          <a:noFill/>
+        </p:spPr>
+        <p:txBody>
+          <a:bodyPr wrap="none" rtlCol="0">
+            <a:spAutoFit/>
+          </a:bodyPr>
+          <a:lstStyle/>
+          <a:p>
+            <a:r>
+              <a:rPr lang="en-US" sz="2000" dirty="0" smtClean="0"/>
+              <a:t>EPANET</a:t>
+            </a:r>
+            <a:endParaRPr lang="en-US" sz="2000" dirty="0"/>
+          </a:p>
+        </p:txBody>
+      </p:sp>
+      <p:sp>
+        <p:nvSpPr>
+          <p:cNvPr id="25" name="TextBox 24"/>
+          <p:cNvSpPr txBox="1"/>
+          <p:nvPr/>
+        </p:nvSpPr>
+        <p:spPr>
+          <a:xfrm>
+            <a:off x="10038995" y="2326338"/>
+            <a:ext cx="988091" cy="400110"/>
+          </a:xfrm>
+          <a:prstGeom prst="rect">
+            <a:avLst/>
+          </a:prstGeom>
+          <a:noFill/>
+        </p:spPr>
+        <p:txBody>
+          <a:bodyPr wrap="none" rtlCol="0">
+            <a:spAutoFit/>
+          </a:bodyPr>
+          <a:lstStyle/>
+          <a:p>
+            <a:r>
+              <a:rPr lang="en-US" sz="2000" dirty="0" smtClean="0"/>
+              <a:t>EPANET</a:t>
+            </a:r>
+            <a:endParaRPr lang="en-US" sz="2000" dirty="0"/>
+          </a:p>
+        </p:txBody>
+      </p:sp>
+      <p:sp>
+        <p:nvSpPr>
+          <p:cNvPr id="26" name="TextBox 25"/>
+          <p:cNvSpPr txBox="1"/>
+          <p:nvPr/>
+        </p:nvSpPr>
+        <p:spPr>
+          <a:xfrm>
+            <a:off x="1043602" y="2326338"/>
+            <a:ext cx="968278" cy="400110"/>
+          </a:xfrm>
+          <a:prstGeom prst="rect">
+            <a:avLst/>
+          </a:prstGeom>
+          <a:noFill/>
+        </p:spPr>
+        <p:txBody>
+          <a:bodyPr wrap="none" rtlCol="0">
+            <a:spAutoFit/>
+          </a:bodyPr>
+          <a:lstStyle/>
+          <a:p>
+            <a:r>
+              <a:rPr lang="en-US" sz="2000" dirty="0" smtClean="0"/>
+              <a:t>SWMM</a:t>
+            </a:r>
+            <a:endParaRPr lang="en-US" sz="2000" dirty="0"/>
+          </a:p>
+        </p:txBody>
+      </p:sp>
+      <p:sp>
+        <p:nvSpPr>
+          <p:cNvPr id="27" name="TextBox 26"/>
+          <p:cNvSpPr txBox="1"/>
+          <p:nvPr/>
+        </p:nvSpPr>
+        <p:spPr>
+          <a:xfrm>
+            <a:off x="7234320" y="2338881"/>
+            <a:ext cx="968278" cy="400110"/>
+          </a:xfrm>
+          <a:prstGeom prst="rect">
+            <a:avLst/>
+          </a:prstGeom>
+          <a:noFill/>
+        </p:spPr>
+        <p:txBody>
+          <a:bodyPr wrap="none" rtlCol="0">
+            <a:spAutoFit/>
+          </a:bodyPr>
+          <a:lstStyle/>
+          <a:p>
+            <a:r>
+              <a:rPr lang="en-US" sz="2000" dirty="0" smtClean="0"/>
+              <a:t>SWMM</a:t>
+            </a:r>
+            <a:endParaRPr lang="en-US" sz="2000" dirty="0"/>
+          </a:p>
+        </p:txBody>
+      </p:sp>
     </p:spTree>
     <p:extLst>
       <p:ext uri="{BB962C8B-B14F-4D97-AF65-F5344CB8AC3E}">

</xml_diff>